<commit_message>
cfast tg: update radiation section
</commit_message>
<xml_diff>
--- a/Docs/Tech_Ref/FIGURES/solidanglesetup.pptx
+++ b/Docs/Tech_Ref/FIGURES/solidanglesetup.pptx
@@ -238,7 +238,7 @@
           <a:p>
             <a:fld id="{DB1A0588-BD2B-4491-BED8-3F7A36165C09}" type="datetimeFigureOut">
               <a:rPr lang="en-US" smtClean="0"/>
-              <a:t>8/7/2015</a:t>
+              <a:t>8/8/2015</a:t>
             </a:fld>
             <a:endParaRPr lang="en-US"/>
           </a:p>
@@ -408,7 +408,7 @@
           <a:p>
             <a:fld id="{DB1A0588-BD2B-4491-BED8-3F7A36165C09}" type="datetimeFigureOut">
               <a:rPr lang="en-US" smtClean="0"/>
-              <a:t>8/7/2015</a:t>
+              <a:t>8/8/2015</a:t>
             </a:fld>
             <a:endParaRPr lang="en-US"/>
           </a:p>
@@ -588,7 +588,7 @@
           <a:p>
             <a:fld id="{DB1A0588-BD2B-4491-BED8-3F7A36165C09}" type="datetimeFigureOut">
               <a:rPr lang="en-US" smtClean="0"/>
-              <a:t>8/7/2015</a:t>
+              <a:t>8/8/2015</a:t>
             </a:fld>
             <a:endParaRPr lang="en-US"/>
           </a:p>
@@ -758,7 +758,7 @@
           <a:p>
             <a:fld id="{DB1A0588-BD2B-4491-BED8-3F7A36165C09}" type="datetimeFigureOut">
               <a:rPr lang="en-US" smtClean="0"/>
-              <a:t>8/7/2015</a:t>
+              <a:t>8/8/2015</a:t>
             </a:fld>
             <a:endParaRPr lang="en-US"/>
           </a:p>
@@ -1004,7 +1004,7 @@
           <a:p>
             <a:fld id="{DB1A0588-BD2B-4491-BED8-3F7A36165C09}" type="datetimeFigureOut">
               <a:rPr lang="en-US" smtClean="0"/>
-              <a:t>8/7/2015</a:t>
+              <a:t>8/8/2015</a:t>
             </a:fld>
             <a:endParaRPr lang="en-US"/>
           </a:p>
@@ -1236,7 +1236,7 @@
           <a:p>
             <a:fld id="{DB1A0588-BD2B-4491-BED8-3F7A36165C09}" type="datetimeFigureOut">
               <a:rPr lang="en-US" smtClean="0"/>
-              <a:t>8/7/2015</a:t>
+              <a:t>8/8/2015</a:t>
             </a:fld>
             <a:endParaRPr lang="en-US"/>
           </a:p>
@@ -1603,7 +1603,7 @@
           <a:p>
             <a:fld id="{DB1A0588-BD2B-4491-BED8-3F7A36165C09}" type="datetimeFigureOut">
               <a:rPr lang="en-US" smtClean="0"/>
-              <a:t>8/7/2015</a:t>
+              <a:t>8/8/2015</a:t>
             </a:fld>
             <a:endParaRPr lang="en-US"/>
           </a:p>
@@ -1721,7 +1721,7 @@
           <a:p>
             <a:fld id="{DB1A0588-BD2B-4491-BED8-3F7A36165C09}" type="datetimeFigureOut">
               <a:rPr lang="en-US" smtClean="0"/>
-              <a:t>8/7/2015</a:t>
+              <a:t>8/8/2015</a:t>
             </a:fld>
             <a:endParaRPr lang="en-US"/>
           </a:p>
@@ -1816,7 +1816,7 @@
           <a:p>
             <a:fld id="{DB1A0588-BD2B-4491-BED8-3F7A36165C09}" type="datetimeFigureOut">
               <a:rPr lang="en-US" smtClean="0"/>
-              <a:t>8/7/2015</a:t>
+              <a:t>8/8/2015</a:t>
             </a:fld>
             <a:endParaRPr lang="en-US"/>
           </a:p>
@@ -2093,7 +2093,7 @@
           <a:p>
             <a:fld id="{DB1A0588-BD2B-4491-BED8-3F7A36165C09}" type="datetimeFigureOut">
               <a:rPr lang="en-US" smtClean="0"/>
-              <a:t>8/7/2015</a:t>
+              <a:t>8/8/2015</a:t>
             </a:fld>
             <a:endParaRPr lang="en-US"/>
           </a:p>
@@ -2346,7 +2346,7 @@
           <a:p>
             <a:fld id="{DB1A0588-BD2B-4491-BED8-3F7A36165C09}" type="datetimeFigureOut">
               <a:rPr lang="en-US" smtClean="0"/>
-              <a:t>8/7/2015</a:t>
+              <a:t>8/8/2015</a:t>
             </a:fld>
             <a:endParaRPr lang="en-US"/>
           </a:p>
@@ -2559,7 +2559,7 @@
           <a:p>
             <a:fld id="{DB1A0588-BD2B-4491-BED8-3F7A36165C09}" type="datetimeFigureOut">
               <a:rPr lang="en-US" smtClean="0"/>
-              <a:t>8/7/2015</a:t>
+              <a:t>8/8/2015</a:t>
             </a:fld>
             <a:endParaRPr lang="en-US"/>
           </a:p>
@@ -3248,14 +3248,14 @@
           <a:lstStyle/>
           <a:p>
             <a:r>
-              <a:rPr lang="en-US" dirty="0" smtClean="0"/>
+              <a:rPr lang="en-US" i="1" dirty="0" smtClean="0"/>
               <a:t>v</a:t>
             </a:r>
             <a:r>
-              <a:rPr lang="en-US" baseline="-25000" dirty="0" smtClean="0"/>
+              <a:rPr lang="en-US" i="1" baseline="-25000" dirty="0" smtClean="0"/>
               <a:t>1</a:t>
             </a:r>
-            <a:endParaRPr lang="en-US" baseline="-25000" dirty="0"/>
+            <a:endParaRPr lang="en-US" i="1" baseline="-25000" dirty="0"/>
           </a:p>
         </p:txBody>
       </p:sp>
@@ -3282,14 +3282,14 @@
           <a:lstStyle/>
           <a:p>
             <a:r>
-              <a:rPr lang="en-US" dirty="0" smtClean="0"/>
+              <a:rPr lang="en-US" i="1" dirty="0" smtClean="0"/>
               <a:t>v</a:t>
             </a:r>
             <a:r>
-              <a:rPr lang="en-US" baseline="-25000" dirty="0" smtClean="0"/>
+              <a:rPr lang="en-US" i="1" baseline="-25000" dirty="0" smtClean="0"/>
               <a:t>2</a:t>
             </a:r>
-            <a:endParaRPr lang="en-US" baseline="-25000" dirty="0"/>
+            <a:endParaRPr lang="en-US" i="1" baseline="-25000" dirty="0"/>
           </a:p>
         </p:txBody>
       </p:sp>
@@ -3316,14 +3316,14 @@
           <a:lstStyle/>
           <a:p>
             <a:r>
-              <a:rPr lang="en-US" dirty="0" smtClean="0"/>
+              <a:rPr lang="en-US" i="1" dirty="0" smtClean="0"/>
               <a:t>v</a:t>
             </a:r>
             <a:r>
-              <a:rPr lang="en-US" baseline="-25000" dirty="0" smtClean="0"/>
+              <a:rPr lang="en-US" i="1" baseline="-25000" dirty="0" smtClean="0"/>
               <a:t>3</a:t>
             </a:r>
-            <a:endParaRPr lang="en-US" baseline="-25000" dirty="0"/>
+            <a:endParaRPr lang="en-US" i="1" baseline="-25000" dirty="0"/>
           </a:p>
         </p:txBody>
       </p:sp>
@@ -3602,7 +3602,7 @@
   <a:extraClrSchemeLst/>
   <a:extLst>
     <a:ext uri="{05A4C25C-085E-4340-85A3-A5531E510DB2}">
-      <thm15:themeFamily xmlns="" xmlns:thm15="http://schemas.microsoft.com/office/thememl/2012/main" name="Office Theme" id="{62F939B6-93AF-4DB8-9C6B-D6C7DFDC589F}" vid="{4A3C46E8-61CC-4603-A589-7422A47A8E4A}"/>
+      <thm15:themeFamily xmlns:thm15="http://schemas.microsoft.com/office/thememl/2012/main" xmlns="" name="Office Theme" id="{62F939B6-93AF-4DB8-9C6B-D6C7DFDC589F}" vid="{4A3C46E8-61CC-4603-A589-7422A47A8E4A}"/>
     </a:ext>
   </a:extLst>
 </a:theme>

</xml_diff>